<commit_message>
Fixed small problem in database model
</commit_message>
<xml_diff>
--- a/Documentation/Final Presentation/Presentation.pptx
+++ b/Documentation/Final Presentation/Presentation.pptx
@@ -13879,10 +13879,10 @@
       </p:sp>
       <p:pic>
         <p:nvPicPr>
-          <p:cNvPr id="4" name="Picture 3" descr="Graphical user interface&#10;&#10;Description automatically generated">
-            <a:extLst>
-              <a:ext uri="{FF2B5EF4-FFF2-40B4-BE49-F238E27FC236}">
-                <a16:creationId xmlns:a16="http://schemas.microsoft.com/office/drawing/2014/main" id="{C78F9A8C-0571-451B-9A13-D485B4942D23}"/>
+          <p:cNvPr id="5" name="Picture 4" descr="Graphical user interface&#10;&#10;Description automatically generated">
+            <a:extLst>
+              <a:ext uri="{FF2B5EF4-FFF2-40B4-BE49-F238E27FC236}">
+                <a16:creationId xmlns:a16="http://schemas.microsoft.com/office/drawing/2014/main" id="{9F92387E-ACC4-4DE7-9366-26AADBEA78ED}"/>
               </a:ext>
             </a:extLst>
           </p:cNvPr>
@@ -13899,8 +13899,8 @@
         </p:blipFill>
         <p:spPr>
           <a:xfrm>
-            <a:off x="4318000" y="609843"/>
-            <a:ext cx="7874000" cy="6248157"/>
+            <a:off x="4303643" y="598451"/>
+            <a:ext cx="7888357" cy="6259549"/>
           </a:xfrm>
           <a:prstGeom prst="rect">
             <a:avLst/>
@@ -18089,21 +18089,21 @@
 </file>
 
 <file path=customXml/item1.xml><?xml version="1.0" encoding="utf-8"?>
+<?mso-contentType ?>
+<FormTemplates xmlns="http://schemas.microsoft.com/sharepoint/v3/contenttype/forms">
+  <Display>DocumentLibraryForm</Display>
+  <Edit>DocumentLibraryForm</Edit>
+  <New>DocumentLibraryForm</New>
+</FormTemplates>
+</file>
+
+<file path=customXml/item2.xml><?xml version="1.0" encoding="utf-8"?>
 <p:properties xmlns:p="http://schemas.microsoft.com/office/2006/metadata/properties" xmlns:xsi="http://www.w3.org/2001/XMLSchema-instance" xmlns:pc="http://schemas.microsoft.com/office/infopath/2007/PartnerControls">
   <documentManagement>
     <Status xmlns="71af3243-3dd4-4a8d-8c0d-dd76da1f02a5">Not started</Status>
     <MediaServiceKeyPoints xmlns="71af3243-3dd4-4a8d-8c0d-dd76da1f02a5" xsi:nil="true"/>
   </documentManagement>
 </p:properties>
-</file>
-
-<file path=customXml/item2.xml><?xml version="1.0" encoding="utf-8"?>
-<?mso-contentType ?>
-<FormTemplates xmlns="http://schemas.microsoft.com/sharepoint/v3/contenttype/forms">
-  <Display>DocumentLibraryForm</Display>
-  <Edit>DocumentLibraryForm</Edit>
-  <New>DocumentLibraryForm</New>
-</FormTemplates>
 </file>
 
 <file path=customXml/item3.xml><?xml version="1.0" encoding="utf-8"?>
@@ -18328,19 +18328,19 @@
 </file>
 
 <file path=customXml/itemProps1.xml><?xml version="1.0" encoding="utf-8"?>
+<ds:datastoreItem xmlns:ds="http://schemas.openxmlformats.org/officeDocument/2006/customXml" ds:itemID="{3C8E00D1-8EA3-4E42-801D-0253E1EAFC21}">
+  <ds:schemaRefs>
+    <ds:schemaRef ds:uri="http://schemas.microsoft.com/sharepoint/v3/contenttype/forms"/>
+  </ds:schemaRefs>
+</ds:datastoreItem>
+</file>
+
+<file path=customXml/itemProps2.xml><?xml version="1.0" encoding="utf-8"?>
 <ds:datastoreItem xmlns:ds="http://schemas.openxmlformats.org/officeDocument/2006/customXml" ds:itemID="{99919F73-B6C2-4A43-95E2-833EC48925FE}">
   <ds:schemaRefs>
     <ds:schemaRef ds:uri="http://schemas.microsoft.com/office/2006/metadata/properties"/>
     <ds:schemaRef ds:uri="http://schemas.microsoft.com/office/infopath/2007/PartnerControls"/>
     <ds:schemaRef ds:uri="71af3243-3dd4-4a8d-8c0d-dd76da1f02a5"/>
-  </ds:schemaRefs>
-</ds:datastoreItem>
-</file>
-
-<file path=customXml/itemProps2.xml><?xml version="1.0" encoding="utf-8"?>
-<ds:datastoreItem xmlns:ds="http://schemas.openxmlformats.org/officeDocument/2006/customXml" ds:itemID="{3C8E00D1-8EA3-4E42-801D-0253E1EAFC21}">
-  <ds:schemaRefs>
-    <ds:schemaRef ds:uri="http://schemas.microsoft.com/sharepoint/v3/contenttype/forms"/>
   </ds:schemaRefs>
 </ds:datastoreItem>
 </file>

</xml_diff>